<commit_message>
Add website screenshot to readme
</commit_message>
<xml_diff>
--- a/docs/Презентация - AlTo.pptx
+++ b/docs/Презентация - AlTo.pptx
@@ -10989,7 +10989,7 @@
         <p:spPr>
           <a:xfrm>
             <a:off x="1893829" y="1363673"/>
-            <a:ext cx="9733281" cy="3359061"/>
+            <a:ext cx="9733281" cy="3913059"/>
           </a:xfrm>
           <a:prstGeom prst="rect">
             <a:avLst/>
@@ -11001,6 +11001,25 @@
             <a:spAutoFit/>
           </a:bodyPr>
           <a:lstStyle/>
+          <a:p>
+            <a:pPr marL="285750" indent="-285750">
+              <a:lnSpc>
+                <a:spcPct val="150000"/>
+              </a:lnSpc>
+              <a:buFont typeface="Arial" panose="020B0604020202020204" pitchFamily="34" charset="0"/>
+              <a:buChar char="•"/>
+            </a:pPr>
+            <a:r>
+              <a:rPr lang="bg-BG" sz="2400" dirty="0">
+                <a:latin typeface="gg sans"/>
+              </a:rPr>
+              <a:t>Целева група – Болници и лечебни заведения</a:t>
+            </a:r>
+            <a:endParaRPr lang="bg-BG" sz="2400" b="0" i="0" dirty="0">
+              <a:effectLst/>
+              <a:latin typeface="gg sans"/>
+            </a:endParaRPr>
+          </a:p>
           <a:p>
             <a:pPr marL="285750" indent="-285750">
               <a:lnSpc>
@@ -11120,7 +11139,9 @@
               </a:rPr>
               <a:t>Намиране на инвеститори за проекта</a:t>
             </a:r>
-            <a:endParaRPr lang="bg-BG" sz="2400" dirty="0"/>
+            <a:endParaRPr lang="en-US" sz="2400" dirty="0">
+              <a:latin typeface="gg sans"/>
+            </a:endParaRPr>
           </a:p>
         </p:txBody>
       </p:sp>
@@ -15717,18 +15738,18 @@
 </file>
 
 <file path=customXml/item2.xml><?xml version="1.0" encoding="utf-8"?>
+<p:properties xmlns:p="http://schemas.microsoft.com/office/2006/metadata/properties" xmlns:xsi="http://www.w3.org/2001/XMLSchema-instance" xmlns:pc="http://schemas.microsoft.com/office/infopath/2007/PartnerControls">
+  <documentManagement/>
+</p:properties>
+</file>
+
+<file path=customXml/item3.xml><?xml version="1.0" encoding="utf-8"?>
 <?mso-contentType ?>
 <FormTemplates xmlns="http://schemas.microsoft.com/sharepoint/v3/contenttype/forms">
   <Display>DocumentLibraryForm</Display>
   <Edit>DocumentLibraryForm</Edit>
   <New>DocumentLibraryForm</New>
 </FormTemplates>
-</file>
-
-<file path=customXml/item3.xml><?xml version="1.0" encoding="utf-8"?>
-<p:properties xmlns:p="http://schemas.microsoft.com/office/2006/metadata/properties" xmlns:xsi="http://www.w3.org/2001/XMLSchema-instance" xmlns:pc="http://schemas.microsoft.com/office/infopath/2007/PartnerControls">
-  <documentManagement/>
-</p:properties>
 </file>
 
 <file path=customXml/itemProps1.xml><?xml version="1.0" encoding="utf-8"?>
@@ -15751,14 +15772,6 @@
 </file>
 
 <file path=customXml/itemProps2.xml><?xml version="1.0" encoding="utf-8"?>
-<ds:datastoreItem xmlns:ds="http://schemas.openxmlformats.org/officeDocument/2006/customXml" ds:itemID="{0F8E85DB-CC93-42B5-B825-76D9AB0141F6}">
-  <ds:schemaRefs>
-    <ds:schemaRef ds:uri="http://schemas.microsoft.com/sharepoint/v3/contenttype/forms"/>
-  </ds:schemaRefs>
-</ds:datastoreItem>
-</file>
-
-<file path=customXml/itemProps3.xml><?xml version="1.0" encoding="utf-8"?>
 <ds:datastoreItem xmlns:ds="http://schemas.openxmlformats.org/officeDocument/2006/customXml" ds:itemID="{AF7C0069-64A7-47EC-A2D7-753BF1FD2584}">
   <ds:schemaRefs>
     <ds:schemaRef ds:uri="http://purl.org/dc/elements/1.1/"/>
@@ -15773,4 +15786,12 @@
     <ds:schemaRef ds:uri="http://purl.org/dc/terms/"/>
   </ds:schemaRefs>
 </ds:datastoreItem>
+</file>
+
+<file path=customXml/itemProps3.xml><?xml version="1.0" encoding="utf-8"?>
+<ds:datastoreItem xmlns:ds="http://schemas.openxmlformats.org/officeDocument/2006/customXml" ds:itemID="{0F8E85DB-CC93-42B5-B825-76D9AB0141F6}">
+  <ds:schemaRefs>
+    <ds:schemaRef ds:uri="http://schemas.microsoft.com/sharepoint/v3/contenttype/forms"/>
+  </ds:schemaRefs>
+</ds:datastoreItem>
 </file>
</xml_diff>